<commit_message>
Hands On Demos for Day 11
</commit_message>
<xml_diff>
--- a/Day 11/Slides/6. Configuration of Spring and JPA for Development/configuration-of-spring-and-jpa-for-development-slides.pptx
+++ b/Day 11/Slides/6. Configuration of Spring and JPA for Development/configuration-of-spring-and-jpa-for-development-slides.pptx
@@ -5494,7 +5494,7 @@
         <p:spPr>
           <a:xfrm>
             <a:off x="1227702" y="2333156"/>
-            <a:ext cx="14010640" cy="7564755"/>
+            <a:ext cx="14010640" cy="7685405"/>
           </a:xfrm>
           <a:prstGeom prst="rect">
             <a:avLst/>
@@ -5727,7 +5727,23 @@
                 <a:cs typeface="Courier New" panose="02070309020205020404"/>
                 <a:hlinkClick r:id="rId1"/>
               </a:rPr>
-              <a:t>"bobthebuilder@pluralsight.com"); </a:t>
+              <a:t>"bobthebuilder@</a:t>
+            </a:r>
+            <a:r>
+              <a:rPr lang="en-US" sz="3450" spc="5" dirty="0">
+                <a:latin typeface="Courier New" panose="02070309020205020404"/>
+                <a:cs typeface="Courier New" panose="02070309020205020404"/>
+                <a:hlinkClick r:id="rId1"/>
+              </a:rPr>
+              <a:t>mycompany</a:t>
+            </a:r>
+            <a:r>
+              <a:rPr sz="3450" spc="5" dirty="0">
+                <a:latin typeface="Courier New" panose="02070309020205020404"/>
+                <a:cs typeface="Courier New" panose="02070309020205020404"/>
+                <a:hlinkClick r:id="rId1"/>
+              </a:rPr>
+              <a:t>.com"); </a:t>
             </a:r>
             <a:r>
               <a:rPr sz="3450" spc="10" dirty="0">

</xml_diff>